<commit_message>
Ameliorations de l'affichage des filtres et de la coloration
</commit_message>
<xml_diff>
--- a/TUTO_EVENTDENSITY.pptx
+++ b/TUTO_EVENTDENSITY.pptx
@@ -215,7 +215,7 @@
             <a:fld id="{BDF2A71B-5DC1-4CC3-81B5-30C08E317B94}" type="datetimeFigureOut">
               <a:rPr lang="fr-FR" smtClean="0"/>
               <a:pPr/>
-              <a:t>08/02/2023</a:t>
+              <a:t>13/02/2023</a:t>
             </a:fld>
             <a:endParaRPr lang="fr-FR"/>
           </a:p>
@@ -571,6 +571,91 @@
 </p:notes>
 </file>
 
+<file path=ppt/notesSlides/notesSlide2.xml><?xml version="1.0" encoding="utf-8"?>
+<p:notes xmlns:a="http://schemas.openxmlformats.org/drawingml/2006/main" xmlns:r="http://schemas.openxmlformats.org/officeDocument/2006/relationships" xmlns:p="http://schemas.openxmlformats.org/presentationml/2006/main">
+  <p:cSld>
+    <p:spTree>
+      <p:nvGrpSpPr>
+        <p:cNvPr id="1" name=""/>
+        <p:cNvGrpSpPr/>
+        <p:nvPr/>
+      </p:nvGrpSpPr>
+      <p:grpSpPr>
+        <a:xfrm>
+          <a:off x="0" y="0"/>
+          <a:ext cx="0" cy="0"/>
+          <a:chOff x="0" y="0"/>
+          <a:chExt cx="0" cy="0"/>
+        </a:xfrm>
+      </p:grpSpPr>
+      <p:sp>
+        <p:nvSpPr>
+          <p:cNvPr id="2" name="Espace réservé de l'image des diapositives 1"/>
+          <p:cNvSpPr>
+            <a:spLocks noGrp="1" noRot="1" noChangeAspect="1"/>
+          </p:cNvSpPr>
+          <p:nvPr>
+            <p:ph type="sldImg"/>
+          </p:nvPr>
+        </p:nvSpPr>
+        <p:spPr/>
+      </p:sp>
+      <p:sp>
+        <p:nvSpPr>
+          <p:cNvPr id="3" name="Espace réservé des notes 2"/>
+          <p:cNvSpPr>
+            <a:spLocks noGrp="1"/>
+          </p:cNvSpPr>
+          <p:nvPr>
+            <p:ph type="body" idx="1"/>
+          </p:nvPr>
+        </p:nvSpPr>
+        <p:spPr/>
+        <p:txBody>
+          <a:bodyPr/>
+          <a:lstStyle/>
+          <a:p>
+            <a:endParaRPr lang="fr-FR" dirty="0"/>
+          </a:p>
+        </p:txBody>
+      </p:sp>
+      <p:sp>
+        <p:nvSpPr>
+          <p:cNvPr id="4" name="Espace réservé du numéro de diapositive 3"/>
+          <p:cNvSpPr>
+            <a:spLocks noGrp="1"/>
+          </p:cNvSpPr>
+          <p:nvPr>
+            <p:ph type="sldNum" sz="quarter" idx="10"/>
+          </p:nvPr>
+        </p:nvSpPr>
+        <p:spPr/>
+        <p:txBody>
+          <a:bodyPr/>
+          <a:lstStyle/>
+          <a:p>
+            <a:fld id="{1196F097-BE11-43AE-B31F-1224F494EECC}" type="slidenum">
+              <a:rPr lang="fr-FR" smtClean="0"/>
+              <a:pPr/>
+              <a:t>6</a:t>
+            </a:fld>
+            <a:endParaRPr lang="fr-FR"/>
+          </a:p>
+        </p:txBody>
+      </p:sp>
+    </p:spTree>
+    <p:extLst>
+      <p:ext uri="{BB962C8B-B14F-4D97-AF65-F5344CB8AC3E}">
+        <p14:creationId xmlns:p14="http://schemas.microsoft.com/office/powerpoint/2010/main" val="1082992063"/>
+      </p:ext>
+    </p:extLst>
+  </p:cSld>
+  <p:clrMapOvr>
+    <a:masterClrMapping/>
+  </p:clrMapOvr>
+</p:notes>
+</file>
+
 <file path=ppt/slideLayouts/slideLayout1.xml><?xml version="1.0" encoding="utf-8"?>
 <p:sldLayout xmlns:a="http://schemas.openxmlformats.org/drawingml/2006/main" xmlns:r="http://schemas.openxmlformats.org/officeDocument/2006/relationships" xmlns:p="http://schemas.openxmlformats.org/presentationml/2006/main" type="blank" preserve="1">
   <p:cSld name="Vide">
@@ -606,7 +691,7 @@
             <a:fld id="{2AD8A078-8F0D-4B44-934F-D3DB161891DE}" type="datetimeFigureOut">
               <a:rPr lang="fr-FR" smtClean="0"/>
               <a:pPr/>
-              <a:t>08/02/2023</a:t>
+              <a:t>13/02/2023</a:t>
             </a:fld>
             <a:endParaRPr lang="fr-FR"/>
           </a:p>
@@ -821,7 +906,7 @@
             <a:fld id="{2AD8A078-8F0D-4B44-934F-D3DB161891DE}" type="datetimeFigureOut">
               <a:rPr lang="fr-FR" smtClean="0"/>
               <a:pPr/>
-              <a:t>08/02/2023</a:t>
+              <a:t>13/02/2023</a:t>
             </a:fld>
             <a:endParaRPr lang="fr-FR"/>
           </a:p>
@@ -1761,8 +1846,8 @@
         </p:nvSpPr>
         <p:spPr>
           <a:xfrm>
-            <a:off x="172993" y="4301630"/>
-            <a:ext cx="8736227" cy="369332"/>
+            <a:off x="172993" y="4275504"/>
+            <a:ext cx="8736227" cy="646331"/>
           </a:xfrm>
           <a:prstGeom prst="rect">
             <a:avLst/>
@@ -1776,7 +1861,17 @@
           <a:p>
             <a:r>
               <a:rPr lang="fr-FR" dirty="0" smtClean="0"/>
-              <a:t>Les points peuvent être colorés selon la valeur d’un des attributs</a:t>
+              <a:t>Les points peuvent être colorés selon la valeur d’un des </a:t>
+            </a:r>
+            <a:r>
+              <a:rPr lang="fr-FR" dirty="0" smtClean="0"/>
+              <a:t>attributs.</a:t>
+            </a:r>
+          </a:p>
+          <a:p>
+            <a:r>
+              <a:rPr lang="fr-FR" dirty="0" smtClean="0"/>
+              <a:t>La légende s’affiche ainsi :</a:t>
             </a:r>
             <a:endParaRPr lang="fr-FR" dirty="0"/>
           </a:p>
@@ -2233,7 +2328,7 @@
         <p:spPr>
           <a:xfrm>
             <a:off x="172995" y="1210963"/>
-            <a:ext cx="8736227" cy="3970318"/>
+            <a:ext cx="8736227" cy="4524315"/>
           </a:xfrm>
           <a:prstGeom prst="rect">
             <a:avLst/>
@@ -2261,22 +2356,26 @@
               <a:rPr lang="fr-FR" dirty="0" smtClean="0"/>
               <a:t> au préalable.</a:t>
             </a:r>
-          </a:p>
-          <a:p>
             <a:endParaRPr lang="fr-FR" dirty="0" smtClean="0"/>
           </a:p>
           <a:p>
-            <a:r>
-              <a:rPr lang="fr-FR" dirty="0" smtClean="0"/>
-              <a:t>Le plus simple est d’utiliser le logiciel </a:t>
+            <a:endParaRPr lang="fr-FR" dirty="0" smtClean="0"/>
+          </a:p>
+          <a:p>
+            <a:r>
+              <a:rPr lang="fr-FR" dirty="0" smtClean="0"/>
+              <a:t>Pour obtenir des tuiles, il est possible d’utiliser le logiciel </a:t>
             </a:r>
             <a:r>
               <a:rPr lang="fr-FR" dirty="0" err="1" smtClean="0">
-                <a:hlinkClick r:id="rId2"/>
+                <a:hlinkClick r:id="rId3"/>
               </a:rPr>
               <a:t>maperitive</a:t>
             </a:r>
-            <a:endParaRPr lang="fr-FR" dirty="0" smtClean="0"/>
+            <a:r>
+              <a:rPr lang="fr-FR" dirty="0" smtClean="0"/>
+              <a:t> (http://maperitive.net)</a:t>
+            </a:r>
           </a:p>
           <a:p>
             <a:endParaRPr lang="fr-FR" dirty="0" smtClean="0"/>
@@ -2300,7 +2399,7 @@
             </a:r>
           </a:p>
           <a:p>
-            <a:endParaRPr lang="fr-FR" dirty="0"/>
+            <a:endParaRPr lang="fr-FR" dirty="0" smtClean="0"/>
           </a:p>
           <a:p>
             <a:pPr marL="285750" indent="-285750">
@@ -2309,7 +2408,7 @@
             </a:pPr>
             <a:r>
               <a:rPr lang="fr-FR" dirty="0" smtClean="0"/>
-              <a:t>zoomer </a:t>
+              <a:t>Se déplacer / zoomer </a:t>
             </a:r>
             <a:r>
               <a:rPr lang="fr-FR" dirty="0"/>
@@ -2337,22 +2436,22 @@
               <a:buChar char="-"/>
             </a:pPr>
             <a:r>
-              <a:rPr lang="fr-FR" dirty="0" smtClean="0"/>
+              <a:rPr lang="fr-FR" b="1" dirty="0" smtClean="0"/>
               <a:t>set-</a:t>
             </a:r>
             <a:r>
-              <a:rPr lang="fr-FR" dirty="0" err="1" smtClean="0"/>
+              <a:rPr lang="fr-FR" b="1" dirty="0" err="1" smtClean="0"/>
               <a:t>geo</a:t>
             </a:r>
             <a:r>
-              <a:rPr lang="fr-FR" dirty="0" smtClean="0"/>
+              <a:rPr lang="fr-FR" b="1" dirty="0" smtClean="0"/>
               <a:t>-</a:t>
             </a:r>
             <a:r>
-              <a:rPr lang="fr-FR" dirty="0" err="1" smtClean="0"/>
+              <a:rPr lang="fr-FR" b="1" dirty="0" err="1" smtClean="0"/>
               <a:t>bounds</a:t>
             </a:r>
-            <a:endParaRPr lang="fr-FR" dirty="0"/>
+            <a:endParaRPr lang="fr-FR" b="1" dirty="0"/>
           </a:p>
           <a:p>
             <a:pPr marL="742950" lvl="1" indent="-285750">
@@ -2360,28 +2459,28 @@
               <a:buChar char="-"/>
             </a:pPr>
             <a:r>
-              <a:rPr lang="fr-FR" dirty="0" err="1" smtClean="0"/>
+              <a:rPr lang="fr-FR" b="1" dirty="0" err="1" smtClean="0"/>
               <a:t>generate-tiles</a:t>
             </a:r>
             <a:r>
-              <a:rPr lang="fr-FR" dirty="0" smtClean="0"/>
+              <a:rPr lang="fr-FR" b="1" dirty="0" smtClean="0"/>
               <a:t> </a:t>
             </a:r>
             <a:r>
-              <a:rPr lang="fr-FR" dirty="0" err="1"/>
+              <a:rPr lang="fr-FR" b="1" dirty="0" err="1"/>
               <a:t>minzoom</a:t>
             </a:r>
             <a:r>
-              <a:rPr lang="fr-FR" dirty="0"/>
+              <a:rPr lang="fr-FR" b="1" dirty="0"/>
               <a:t>=8 </a:t>
             </a:r>
             <a:r>
-              <a:rPr lang="fr-FR" dirty="0" err="1"/>
+              <a:rPr lang="fr-FR" b="1" dirty="0" err="1" smtClean="0"/>
               <a:t>maxzoom</a:t>
             </a:r>
             <a:r>
-              <a:rPr lang="fr-FR" dirty="0"/>
-              <a:t>=12 </a:t>
+              <a:rPr lang="fr-FR" b="1" dirty="0" smtClean="0"/>
+              <a:t>=12</a:t>
             </a:r>
           </a:p>
           <a:p>
@@ -2391,8 +2490,9 @@
             </a:pPr>
             <a:r>
               <a:rPr lang="fr-FR" dirty="0" smtClean="0"/>
-              <a:t>Attendre que la tâche soit terminée</a:t>
-            </a:r>
+              <a:t>Indiquer les niveaux de zoom voulus (plus de niveaux de zoom = plus de tuiles = plus long/plus lourd !)</a:t>
+            </a:r>
+            <a:endParaRPr lang="fr-FR" dirty="0"/>
           </a:p>
           <a:p>
             <a:pPr marL="285750" indent="-285750">
@@ -2401,7 +2501,7 @@
             </a:pPr>
             <a:r>
               <a:rPr lang="fr-FR" dirty="0" smtClean="0"/>
-              <a:t>Copier </a:t>
+              <a:t>Quand la tâche est terminée, copier </a:t>
             </a:r>
             <a:r>
               <a:rPr lang="fr-FR" dirty="0"/>
@@ -2452,13 +2552,56 @@
               <a:t>de </a:t>
             </a:r>
             <a:r>
-              <a:rPr lang="fr-FR" dirty="0" err="1"/>
+              <a:rPr lang="fr-FR" dirty="0" err="1" smtClean="0"/>
               <a:t>EventDensity</a:t>
             </a:r>
+            <a:endParaRPr lang="fr-FR" dirty="0" smtClean="0"/>
+          </a:p>
+          <a:p>
+            <a:pPr marL="285750" indent="-285750">
+              <a:buFontTx/>
+              <a:buChar char="-"/>
+            </a:pPr>
+            <a:r>
+              <a:rPr lang="fr-FR" dirty="0" smtClean="0"/>
+              <a:t>Ouvrir ou redémarrer </a:t>
+            </a:r>
+            <a:r>
+              <a:rPr lang="fr-FR"/>
+              <a:t>EventDensity</a:t>
+            </a:r>
             <a:endParaRPr lang="fr-FR" dirty="0"/>
           </a:p>
         </p:txBody>
       </p:sp>
+      <p:pic>
+        <p:nvPicPr>
+          <p:cNvPr id="4" name="Image 3"/>
+          <p:cNvPicPr>
+            <a:picLocks noChangeAspect="1"/>
+          </p:cNvPicPr>
+          <p:nvPr/>
+        </p:nvPicPr>
+        <p:blipFill rotWithShape="1">
+          <a:blip r:embed="rId4"/>
+          <a:srcRect t="40627" r="20404"/>
+          <a:stretch/>
+        </p:blipFill>
+        <p:spPr>
+          <a:xfrm>
+            <a:off x="5060947" y="5238093"/>
+            <a:ext cx="4083053" cy="1619907"/>
+          </a:xfrm>
+          <a:prstGeom prst="rect">
+            <a:avLst/>
+          </a:prstGeom>
+          <a:ln>
+            <a:solidFill>
+              <a:schemeClr val="tx1"/>
+            </a:solidFill>
+          </a:ln>
+        </p:spPr>
+      </p:pic>
     </p:spTree>
     <p:extLst>
       <p:ext uri="{BB962C8B-B14F-4D97-AF65-F5344CB8AC3E}">

</xml_diff>